<commit_message>
New revision of IETF 99 slides
</commit_message>
<xml_diff>
--- a/Meetings/2017-07-20-IETF99/tnbidt-ietf-99-ccamp-01.pptx
+++ b/Meetings/2017-07-20-IETF99/tnbidt-ietf-99-ccamp-01.pptx
@@ -5,7 +5,7 @@
     <p:sldMasterId id="2147483648" r:id="rId1"/>
   </p:sldMasterIdLst>
   <p:notesMasterIdLst>
-    <p:notesMasterId r:id="rId11"/>
+    <p:notesMasterId r:id="rId12"/>
   </p:notesMasterIdLst>
   <p:sldIdLst>
     <p:sldId id="256" r:id="rId2"/>
@@ -17,6 +17,7 @@
     <p:sldId id="267" r:id="rId8"/>
     <p:sldId id="268" r:id="rId9"/>
     <p:sldId id="261" r:id="rId10"/>
+    <p:sldId id="269" r:id="rId11"/>
   </p:sldIdLst>
   <p:sldSz cx="9144000" cy="6858000" type="screen4x3"/>
   <p:notesSz cx="6858000" cy="9144000"/>
@@ -132,6 +133,10 @@
     </p:ext>
   </p:extLst>
 </p:presentation>
+</file>
+
+<file path=ppt/revisionInfo.xml><?xml version="1.0" encoding="utf-8"?>
+<p1510:revInfo xmlns:a="http://schemas.openxmlformats.org/drawingml/2006/main" xmlns:r="http://schemas.openxmlformats.org/officeDocument/2006/relationships" xmlns:p1510="http://schemas.microsoft.com/office/powerpoint/2015/10/main"/>
 </file>
 
 <file path=ppt/notesMasters/notesMaster1.xml><?xml version="1.0" encoding="utf-8"?>
@@ -3702,6 +3707,106 @@
 </p:sld>
 </file>
 
+<file path=ppt/slides/slide10.xml><?xml version="1.0" encoding="utf-8"?>
+<p:sld xmlns:a="http://schemas.openxmlformats.org/drawingml/2006/main" xmlns:r="http://schemas.openxmlformats.org/officeDocument/2006/relationships" xmlns:p="http://schemas.openxmlformats.org/presentationml/2006/main">
+  <p:cSld>
+    <p:spTree>
+      <p:nvGrpSpPr>
+        <p:cNvPr id="1" name=""/>
+        <p:cNvGrpSpPr/>
+        <p:nvPr/>
+      </p:nvGrpSpPr>
+      <p:grpSpPr>
+        <a:xfrm>
+          <a:off x="0" y="0"/>
+          <a:ext cx="0" cy="0"/>
+          <a:chOff x="0" y="0"/>
+          <a:chExt cx="0" cy="0"/>
+        </a:xfrm>
+      </p:grpSpPr>
+      <p:sp>
+        <p:nvSpPr>
+          <p:cNvPr id="2" name="Title 1">
+            <a:extLst>
+              <a:ext uri="{FF2B5EF4-FFF2-40B4-BE49-F238E27FC236}">
+                <a16:creationId xmlns:a16="http://schemas.microsoft.com/office/drawing/2014/main" id="{D720DB66-3E3B-4234-A403-395CC1D79ED9}"/>
+              </a:ext>
+            </a:extLst>
+          </p:cNvPr>
+          <p:cNvSpPr>
+            <a:spLocks noGrp="1"/>
+          </p:cNvSpPr>
+          <p:nvPr>
+            <p:ph type="title"/>
+          </p:nvPr>
+        </p:nvSpPr>
+        <p:spPr/>
+        <p:txBody>
+          <a:bodyPr/>
+          <a:lstStyle/>
+          <a:p>
+            <a:r>
+              <a:rPr lang="en-GB" dirty="0"/>
+              <a:t>Next Steps</a:t>
+            </a:r>
+          </a:p>
+        </p:txBody>
+      </p:sp>
+      <p:sp>
+        <p:nvSpPr>
+          <p:cNvPr id="3" name="Content Placeholder 2">
+            <a:extLst>
+              <a:ext uri="{FF2B5EF4-FFF2-40B4-BE49-F238E27FC236}">
+                <a16:creationId xmlns:a16="http://schemas.microsoft.com/office/drawing/2014/main" id="{A4D8CE7E-37F6-4723-8665-EB11A975B9A0}"/>
+              </a:ext>
+            </a:extLst>
+          </p:cNvPr>
+          <p:cNvSpPr>
+            <a:spLocks noGrp="1"/>
+          </p:cNvSpPr>
+          <p:nvPr>
+            <p:ph idx="1"/>
+          </p:nvPr>
+        </p:nvSpPr>
+        <p:spPr/>
+        <p:txBody>
+          <a:bodyPr/>
+          <a:lstStyle/>
+          <a:p>
+            <a:r>
+              <a:rPr lang="en-GB" dirty="0"/>
+              <a:t>Socialise I-Ds outside of IETF at other SDOs, these include:</a:t>
+            </a:r>
+          </a:p>
+          <a:p>
+            <a:pPr lvl="1"/>
+            <a:r>
+              <a:rPr lang="en-GB" dirty="0"/>
+              <a:t>ONF</a:t>
+            </a:r>
+          </a:p>
+          <a:p>
+            <a:pPr lvl="1"/>
+            <a:r>
+              <a:rPr lang="en-GB"/>
+              <a:t>MEF</a:t>
+            </a:r>
+          </a:p>
+        </p:txBody>
+      </p:sp>
+    </p:spTree>
+    <p:extLst>
+      <p:ext uri="{BB962C8B-B14F-4D97-AF65-F5344CB8AC3E}">
+        <p14:creationId xmlns:p14="http://schemas.microsoft.com/office/powerpoint/2010/main" val="593488179"/>
+      </p:ext>
+    </p:extLst>
+  </p:cSld>
+  <p:clrMapOvr>
+    <a:masterClrMapping/>
+  </p:clrMapOvr>
+</p:sld>
+</file>
+
 <file path=ppt/slides/slide2.xml><?xml version="1.0" encoding="utf-8"?>
 <p:sld xmlns:a="http://schemas.openxmlformats.org/drawingml/2006/main" xmlns:r="http://schemas.openxmlformats.org/officeDocument/2006/relationships" xmlns:p="http://schemas.openxmlformats.org/presentationml/2006/main">
   <p:cSld>
@@ -4092,7 +4197,7 @@
             <a:pPr lvl="1"/>
             <a:r>
               <a:rPr lang="en-US" dirty="0"/>
-              <a:t>Reformat JSCON code to fit into IETF I-D template</a:t>
+              <a:t>Reformat JSON code to fit into IETF I-D template</a:t>
             </a:r>
           </a:p>
           <a:p>

</xml_diff>